<commit_message>
Work on the graphs of the markov slides
</commit_message>
<xml_diff>
--- a/static/Course_Modularization/Markov models/Markov Sick-Sicker/figures/STM diagram Sick-Sicker.pptx
+++ b/static/Course_Modularization/Markov models/Markov Sick-Sicker/figures/STM diagram Sick-Sicker.pptx
@@ -9132,6 +9132,96 @@
           </a:fontRef>
         </p:style>
       </p:cxnSp>
+      <p:cxnSp>
+        <p:nvCxnSpPr>
+          <p:cNvPr id="51" name="Rechte verbindingslijn met pijl 99">
+            <a:extLst>
+              <a:ext uri="{FF2B5EF4-FFF2-40B4-BE49-F238E27FC236}">
+                <a16:creationId xmlns:a16="http://schemas.microsoft.com/office/drawing/2014/main" id="{2EE45395-B282-9D45-AF02-732E942BF85C}"/>
+              </a:ext>
+            </a:extLst>
+          </p:cNvPr>
+          <p:cNvCxnSpPr>
+            <a:cxnSpLocks/>
+          </p:cNvCxnSpPr>
+          <p:nvPr/>
+        </p:nvCxnSpPr>
+        <p:spPr>
+          <a:xfrm>
+            <a:off x="6878073" y="3130015"/>
+            <a:ext cx="771359" cy="0"/>
+          </a:xfrm>
+          <a:prstGeom prst="straightConnector1">
+            <a:avLst/>
+          </a:prstGeom>
+          <a:ln w="28575">
+            <a:solidFill>
+              <a:schemeClr val="bg1">
+                <a:lumMod val="50000"/>
+              </a:schemeClr>
+            </a:solidFill>
+            <a:tailEnd type="triangle" w="lg" len="lg"/>
+          </a:ln>
+        </p:spPr>
+        <p:style>
+          <a:lnRef idx="1">
+            <a:schemeClr val="accent1"/>
+          </a:lnRef>
+          <a:fillRef idx="0">
+            <a:schemeClr val="accent1"/>
+          </a:fillRef>
+          <a:effectRef idx="0">
+            <a:schemeClr val="accent1"/>
+          </a:effectRef>
+          <a:fontRef idx="minor">
+            <a:schemeClr val="tx1"/>
+          </a:fontRef>
+        </p:style>
+      </p:cxnSp>
+      <p:sp>
+        <p:nvSpPr>
+          <p:cNvPr id="54" name="TextBox 32">
+            <a:extLst>
+              <a:ext uri="{FF2B5EF4-FFF2-40B4-BE49-F238E27FC236}">
+                <a16:creationId xmlns:a16="http://schemas.microsoft.com/office/drawing/2014/main" id="{DEDCB01C-34F5-C34D-8922-312BADF11968}"/>
+              </a:ext>
+            </a:extLst>
+          </p:cNvPr>
+          <p:cNvSpPr txBox="1"/>
+          <p:nvPr/>
+        </p:nvSpPr>
+        <p:spPr>
+          <a:xfrm>
+            <a:off x="6765353" y="2862590"/>
+            <a:ext cx="930847" cy="261610"/>
+          </a:xfrm>
+          <a:prstGeom prst="rect">
+            <a:avLst/>
+          </a:prstGeom>
+          <a:noFill/>
+        </p:spPr>
+        <p:txBody>
+          <a:bodyPr wrap="square" rtlCol="0">
+            <a:spAutoFit/>
+          </a:bodyPr>
+          <a:lstStyle/>
+          <a:p>
+            <a:pPr algn="ctr"/>
+            <a:r>
+              <a:rPr lang="en-US" sz="1100" dirty="0"/>
+              <a:t>p_S1</a:t>
+            </a:r>
+            <a:r>
+              <a:rPr lang="en-US" sz="1100" baseline="-25000" dirty="0"/>
+              <a:t>Τ</a:t>
+            </a:r>
+            <a:r>
+              <a:rPr lang="en-US" sz="1100" dirty="0"/>
+              <a:t>S2</a:t>
+            </a:r>
+          </a:p>
+        </p:txBody>
+      </p:sp>
     </p:spTree>
     <p:extLst>
       <p:ext uri="{BB962C8B-B14F-4D97-AF65-F5344CB8AC3E}">
@@ -11305,7 +11395,7 @@
         </p:nvSpPr>
         <p:spPr>
           <a:xfrm>
-            <a:off x="6705600" y="2895600"/>
+            <a:off x="6705600" y="2743200"/>
             <a:ext cx="930847" cy="261610"/>
           </a:xfrm>
           <a:prstGeom prst="rect">

</xml_diff>